<commit_message>
updated GitHub Enterprise proposal
Not for us, but to help payload teams at AMSAT.
</commit_message>
<xml_diff>
--- a/Papers_Articles_Presentations/Slide_Presentations/20171208_GitHubEnterpriseProposal.pptx
+++ b/Papers_Articles_Presentations/Slide_Presentations/20171208_GitHubEnterpriseProposal.pptx
@@ -9,13 +9,15 @@
     <p:sldId id="257" r:id="rId3"/>
     <p:sldId id="258" r:id="rId4"/>
     <p:sldId id="259" r:id="rId5"/>
-    <p:sldId id="263" r:id="rId6"/>
-    <p:sldId id="260" r:id="rId7"/>
-    <p:sldId id="261" r:id="rId8"/>
-    <p:sldId id="262" r:id="rId9"/>
-    <p:sldId id="265" r:id="rId10"/>
-    <p:sldId id="266" r:id="rId11"/>
-    <p:sldId id="264" r:id="rId12"/>
+    <p:sldId id="268" r:id="rId6"/>
+    <p:sldId id="263" r:id="rId7"/>
+    <p:sldId id="260" r:id="rId8"/>
+    <p:sldId id="261" r:id="rId9"/>
+    <p:sldId id="262" r:id="rId10"/>
+    <p:sldId id="265" r:id="rId11"/>
+    <p:sldId id="266" r:id="rId12"/>
+    <p:sldId id="264" r:id="rId13"/>
+    <p:sldId id="267" r:id="rId14"/>
   </p:sldIdLst>
   <p:sldSz cx="12192000" cy="6858000"/>
   <p:notesSz cx="6858000" cy="9144000"/>
@@ -114,6 +116,11 @@
       </a:defRPr>
     </a:lvl9pPr>
   </p:defaultTextStyle>
+  <p:extLst>
+    <p:ext uri="{EFAFB233-063F-42B5-8137-9DF3F51BA10A}">
+      <p15:sldGuideLst xmlns:p15="http://schemas.microsoft.com/office/powerpoint/2012/main"/>
+    </p:ext>
+  </p:extLst>
 </p:presentation>
 </file>
 
@@ -334,7 +341,7 @@
           <a:p>
             <a:fld id="{9AB3A824-1A51-4B26-AD58-A6D8E14F6C04}" type="datetimeFigureOut">
               <a:rPr lang="en-US" dirty="0"/>
-              <a:t>12/8/17</a:t>
+              <a:t>12/28/17</a:t>
             </a:fld>
             <a:endParaRPr lang="en-US" dirty="0"/>
           </a:p>
@@ -668,7 +675,7 @@
           <a:p>
             <a:fld id="{D857E33E-8B18-4087-B112-809917729534}" type="datetimeFigureOut">
               <a:rPr lang="en-US" dirty="0"/>
-              <a:t>12/8/17</a:t>
+              <a:t>12/28/17</a:t>
             </a:fld>
             <a:endParaRPr lang="en-US" dirty="0"/>
           </a:p>
@@ -970,7 +977,7 @@
           <a:p>
             <a:fld id="{D3FFE419-2371-464F-8239-3959401C3561}" type="datetimeFigureOut">
               <a:rPr lang="en-US" dirty="0"/>
-              <a:t>12/8/17</a:t>
+              <a:t>12/28/17</a:t>
             </a:fld>
             <a:endParaRPr lang="en-US" dirty="0"/>
           </a:p>
@@ -1217,7 +1224,7 @@
           <a:p>
             <a:fld id="{97D162C4-EDD9-4389-A98B-B87ECEA2A816}" type="datetimeFigureOut">
               <a:rPr lang="en-US" dirty="0"/>
-              <a:t>12/8/17</a:t>
+              <a:t>12/28/17</a:t>
             </a:fld>
             <a:endParaRPr lang="en-US" dirty="0"/>
           </a:p>
@@ -1624,7 +1631,7 @@
           <a:p>
             <a:fld id="{3E5059C3-6A89-4494-99FF-5A4D6FFD50EB}" type="datetimeFigureOut">
               <a:rPr lang="en-US" dirty="0"/>
-              <a:t>12/8/17</a:t>
+              <a:t>12/28/17</a:t>
             </a:fld>
             <a:endParaRPr lang="en-US" dirty="0"/>
           </a:p>
@@ -1938,7 +1945,7 @@
           <a:p>
             <a:fld id="{CA954B2F-12DE-47F5-8894-472B206D2E1E}" type="datetimeFigureOut">
               <a:rPr lang="en-US" dirty="0"/>
-              <a:t>12/8/17</a:t>
+              <a:t>12/28/17</a:t>
             </a:fld>
             <a:endParaRPr lang="en-US" dirty="0"/>
           </a:p>
@@ -2482,7 +2489,7 @@
           <a:p>
             <a:fld id="{3F30E46F-7819-4ACF-B48B-48222C2ACC88}" type="datetimeFigureOut">
               <a:rPr lang="en-US" dirty="0"/>
-              <a:t>12/8/17</a:t>
+              <a:t>12/28/17</a:t>
             </a:fld>
             <a:endParaRPr lang="en-US" dirty="0"/>
           </a:p>
@@ -2677,7 +2684,7 @@
           <a:p>
             <a:fld id="{1FAF3416-4057-4DAA-829D-4CA07428D088}" type="datetimeFigureOut">
               <a:rPr lang="en-US" dirty="0"/>
-              <a:t>12/8/17</a:t>
+              <a:t>12/28/17</a:t>
             </a:fld>
             <a:endParaRPr lang="en-US" dirty="0"/>
           </a:p>
@@ -2890,7 +2897,7 @@
           <a:p>
             <a:fld id="{921D9284-D300-4297-87F7-E791DCC15DB1}" type="datetimeFigureOut">
               <a:rPr lang="en-US" dirty="0"/>
-              <a:t>12/8/17</a:t>
+              <a:t>12/28/17</a:t>
             </a:fld>
             <a:endParaRPr lang="en-US" dirty="0"/>
           </a:p>
@@ -3259,7 +3266,7 @@
           <a:p>
             <a:fld id="{37D525BB-DA17-4BA0-B3C8-3AC3ABC827E6}" type="datetimeFigureOut">
               <a:rPr lang="en-US" dirty="0"/>
-              <a:t>12/8/17</a:t>
+              <a:t>12/28/17</a:t>
             </a:fld>
             <a:endParaRPr lang="en-US" dirty="0"/>
           </a:p>
@@ -3662,7 +3669,7 @@
           <a:p>
             <a:fld id="{B16C4C9A-3960-41CF-A4E9-2A8FB932454B}" type="datetimeFigureOut">
               <a:rPr lang="en-US" dirty="0"/>
-              <a:t>12/8/17</a:t>
+              <a:t>12/28/17</a:t>
             </a:fld>
             <a:endParaRPr lang="en-US" dirty="0"/>
           </a:p>
@@ -4000,7 +4007,7 @@
           <a:p>
             <a:fld id="{3CBC1C18-307B-4F68-A007-B5B542270E8D}" type="datetimeFigureOut">
               <a:rPr lang="en-US" dirty="0"/>
-              <a:t>12/8/17</a:t>
+              <a:t>12/28/17</a:t>
             </a:fld>
             <a:endParaRPr lang="en-US" dirty="0"/>
           </a:p>
@@ -4561,14 +4568,35 @@
             <p:ph type="subTitle" idx="1"/>
           </p:nvPr>
         </p:nvSpPr>
-        <p:spPr/>
+        <p:spPr>
+          <a:xfrm>
+            <a:off x="2116476" y="2268786"/>
+            <a:ext cx="6013398" cy="1160213"/>
+          </a:xfrm>
+        </p:spPr>
         <p:txBody>
           <a:bodyPr/>
           <a:lstStyle/>
           <a:p>
             <a:r>
               <a:rPr lang="en-US" dirty="0" smtClean="0"/>
-              <a:t>A home for digital payload design at AMSAT</a:t>
+              <a:t>A </a:t>
+            </a:r>
+            <a:r>
+              <a:rPr lang="en-US" smtClean="0"/>
+              <a:t>ITAR compliant home </a:t>
+            </a:r>
+            <a:r>
+              <a:rPr lang="en-US" dirty="0" smtClean="0"/>
+              <a:t>for </a:t>
+            </a:r>
+            <a:r>
+              <a:rPr lang="en-US" dirty="0" smtClean="0"/>
+              <a:t>payload </a:t>
+            </a:r>
+            <a:r>
+              <a:rPr lang="en-US" dirty="0" smtClean="0"/>
+              <a:t>design at AMSAT</a:t>
             </a:r>
             <a:endParaRPr lang="en-US" dirty="0"/>
           </a:p>
@@ -4621,7 +4649,7 @@
           <a:p>
             <a:r>
               <a:rPr lang="en-US" dirty="0" smtClean="0"/>
-              <a:t>Administration? Training? Maintenance? Benefits?</a:t>
+              <a:t>Provisioning and Installation</a:t>
             </a:r>
             <a:endParaRPr lang="en-US" dirty="0"/>
           </a:p>
@@ -4639,51 +4667,84 @@
         </p:nvSpPr>
         <p:spPr>
           <a:xfrm>
-            <a:off x="1335640" y="2052116"/>
-            <a:ext cx="9935111" cy="4338410"/>
+            <a:off x="1479479" y="1428108"/>
+            <a:ext cx="9090660" cy="4621836"/>
           </a:xfrm>
         </p:spPr>
         <p:txBody>
           <a:bodyPr>
-            <a:normAutofit lnSpcReduction="10000"/>
+            <a:normAutofit fontScale="85000" lnSpcReduction="20000"/>
           </a:bodyPr>
           <a:lstStyle/>
           <a:p>
             <a:r>
               <a:rPr lang="en-US" dirty="0" smtClean="0"/>
-              <a:t>GitHub Enterprise requires some training to use. A variety of training is provided by GitHub Enterprise. </a:t>
-            </a:r>
-            <a:r>
-              <a:rPr lang="en-US" dirty="0"/>
-              <a:t>Support for GitHub Enterprise is offered at no extra cost, 24 hours a day, 5 days a week.</a:t>
+              <a:t>There are a wide variety of ways to provision and install GitHub Enterprise. Since it’s a virtual machine, we have many options. </a:t>
+            </a:r>
+          </a:p>
+          <a:p>
+            <a:r>
+              <a:rPr lang="en-US" dirty="0" smtClean="0"/>
+              <a:t>Amazon Web Service</a:t>
+            </a:r>
+          </a:p>
+          <a:p>
+            <a:r>
+              <a:rPr lang="en-US" dirty="0" smtClean="0"/>
+              <a:t>Azure</a:t>
+            </a:r>
+          </a:p>
+          <a:p>
+            <a:r>
+              <a:rPr lang="en-US" dirty="0" smtClean="0"/>
+              <a:t>Google Cloud</a:t>
+            </a:r>
+          </a:p>
+          <a:p>
+            <a:r>
+              <a:rPr lang="en-US" dirty="0" smtClean="0"/>
+              <a:t>Hyper-V </a:t>
+            </a:r>
+          </a:p>
+          <a:p>
+            <a:r>
+              <a:rPr lang="en-US" dirty="0" smtClean="0"/>
+              <a:t>OpenStack KVM</a:t>
+            </a:r>
+          </a:p>
+          <a:p>
+            <a:r>
+              <a:rPr lang="en-US" dirty="0" smtClean="0"/>
+              <a:t>VMWare</a:t>
+            </a:r>
+          </a:p>
+          <a:p>
+            <a:r>
+              <a:rPr lang="en-US" dirty="0" err="1" smtClean="0"/>
+              <a:t>XenServer</a:t>
             </a:r>
             <a:endParaRPr lang="en-US" dirty="0" smtClean="0"/>
           </a:p>
           <a:p>
             <a:r>
-              <a:rPr lang="en-US" dirty="0" smtClean="0"/>
-              <a:t>A volunteer would be required to administer the virtual appliance. We believe this is less work and less risk than current servers and workspaces. </a:t>
-            </a:r>
-          </a:p>
-          <a:p>
-            <a:r>
-              <a:rPr lang="en-US" dirty="0" smtClean="0"/>
-              <a:t>The primary benefit is that ITAR compliance is positively achieved by a certified service. </a:t>
-            </a:r>
-          </a:p>
-          <a:p>
-            <a:r>
-              <a:rPr lang="en-US" dirty="0" smtClean="0"/>
-              <a:t>Digital payload design at AMSAT can dramatically increase, as it would have a modern, publicized, accessible, regulatory compliant workspace. This is key to  recruiting and retaining volunteer engineering talent in a competitive environment.</a:t>
-            </a:r>
-            <a:endParaRPr lang="en-US" dirty="0"/>
+              <a:rPr lang="en-US" dirty="0"/>
+              <a:t>https://</a:t>
+            </a:r>
+            <a:r>
+              <a:rPr lang="en-US" dirty="0" err="1"/>
+              <a:t>help.github.com</a:t>
+            </a:r>
+            <a:r>
+              <a:rPr lang="en-US" dirty="0"/>
+              <a:t>/enterprise/2.11/admin/guides/installation/provisioning-and-installation/</a:t>
+            </a:r>
           </a:p>
         </p:txBody>
       </p:sp>
     </p:spTree>
     <p:extLst>
       <p:ext uri="{BB962C8B-B14F-4D97-AF65-F5344CB8AC3E}">
-        <p14:creationId xmlns:p14="http://schemas.microsoft.com/office/powerpoint/2010/main" val="255527800"/>
+        <p14:creationId xmlns:p14="http://schemas.microsoft.com/office/powerpoint/2010/main" val="727356344"/>
       </p:ext>
     </p:extLst>
   </p:cSld>
@@ -4720,6 +4781,166 @@
             <p:ph type="title"/>
           </p:nvPr>
         </p:nvSpPr>
+        <p:spPr>
+          <a:xfrm>
+            <a:off x="1109609" y="232704"/>
+            <a:ext cx="10058400" cy="1077229"/>
+          </a:xfrm>
+        </p:spPr>
+        <p:txBody>
+          <a:bodyPr/>
+          <a:lstStyle/>
+          <a:p>
+            <a:r>
+              <a:rPr lang="en-US" dirty="0" smtClean="0"/>
+              <a:t>Administration? Training? Maintenance? Benefits?</a:t>
+            </a:r>
+            <a:endParaRPr lang="en-US" dirty="0"/>
+          </a:p>
+        </p:txBody>
+      </p:sp>
+      <p:sp>
+        <p:nvSpPr>
+          <p:cNvPr id="3" name="Content Placeholder 2"/>
+          <p:cNvSpPr>
+            <a:spLocks noGrp="1"/>
+          </p:cNvSpPr>
+          <p:nvPr>
+            <p:ph idx="1"/>
+          </p:nvPr>
+        </p:nvSpPr>
+        <p:spPr>
+          <a:xfrm>
+            <a:off x="1181528" y="914400"/>
+            <a:ext cx="10089223" cy="5732979"/>
+          </a:xfrm>
+        </p:spPr>
+        <p:txBody>
+          <a:bodyPr>
+            <a:normAutofit/>
+          </a:bodyPr>
+          <a:lstStyle/>
+          <a:p>
+            <a:r>
+              <a:rPr lang="en-US" dirty="0" smtClean="0"/>
+              <a:t>GitHub Enterprise requires some training to use. A variety of training is provided by GitHub Enterprise. </a:t>
+            </a:r>
+            <a:r>
+              <a:rPr lang="en-US" dirty="0"/>
+              <a:t>Support for GitHub Enterprise is offered at no extra cost, 24 hours a day, 5 days a week.</a:t>
+            </a:r>
+            <a:endParaRPr lang="en-US" dirty="0" smtClean="0"/>
+          </a:p>
+          <a:p>
+            <a:r>
+              <a:rPr lang="en-US" dirty="0" smtClean="0"/>
+              <a:t>A volunteer would be required to administer the virtual appliance. We believe this is less work and less risk than current servers and workspaces. </a:t>
+            </a:r>
+            <a:r>
+              <a:rPr lang="en-US" dirty="0" smtClean="0"/>
+              <a:t>Volunteers have stepped forward.</a:t>
+            </a:r>
+          </a:p>
+          <a:p>
+            <a:r>
+              <a:rPr lang="en-US" dirty="0" smtClean="0"/>
+              <a:t>The </a:t>
+            </a:r>
+            <a:r>
+              <a:rPr lang="en-US" dirty="0" smtClean="0"/>
+              <a:t>primary benefit is that ITAR compliance is positively achieved by a certified </a:t>
+            </a:r>
+            <a:r>
+              <a:rPr lang="en-US" dirty="0" smtClean="0"/>
+              <a:t>service</a:t>
+            </a:r>
+            <a:r>
+              <a:rPr lang="en-US" dirty="0"/>
+              <a:t> </a:t>
+            </a:r>
+            <a:r>
+              <a:rPr lang="en-US" dirty="0" smtClean="0"/>
+              <a:t>that is a substantial improvement over the current set of SVN servers. </a:t>
+            </a:r>
+            <a:endParaRPr lang="en-US" dirty="0" smtClean="0"/>
+          </a:p>
+          <a:p>
+            <a:r>
+              <a:rPr lang="en-US" dirty="0" smtClean="0"/>
+              <a:t>Payload design </a:t>
+            </a:r>
+            <a:r>
+              <a:rPr lang="en-US" dirty="0" smtClean="0"/>
+              <a:t>at AMSAT can dramatically </a:t>
+            </a:r>
+            <a:r>
+              <a:rPr lang="en-US" dirty="0" smtClean="0"/>
+              <a:t>improve, </a:t>
+            </a:r>
+            <a:r>
+              <a:rPr lang="en-US" dirty="0" smtClean="0"/>
+              <a:t>as it would have a modern, publicized, accessible, </a:t>
+            </a:r>
+            <a:r>
+              <a:rPr lang="en-US" dirty="0" smtClean="0"/>
+              <a:t>regulatory-compliant </a:t>
+            </a:r>
+            <a:r>
+              <a:rPr lang="en-US" dirty="0" smtClean="0"/>
+              <a:t>workspace. This is key </a:t>
+            </a:r>
+            <a:r>
+              <a:rPr lang="en-US" dirty="0" smtClean="0"/>
+              <a:t>to </a:t>
+            </a:r>
+            <a:r>
+              <a:rPr lang="en-US" dirty="0" smtClean="0"/>
+              <a:t>recruiting and retaining volunteer engineering talent in a competitive environment.</a:t>
+            </a:r>
+            <a:endParaRPr lang="en-US" dirty="0"/>
+          </a:p>
+        </p:txBody>
+      </p:sp>
+    </p:spTree>
+    <p:extLst>
+      <p:ext uri="{BB962C8B-B14F-4D97-AF65-F5344CB8AC3E}">
+        <p14:creationId xmlns:p14="http://schemas.microsoft.com/office/powerpoint/2010/main" val="255527800"/>
+      </p:ext>
+    </p:extLst>
+  </p:cSld>
+  <p:clrMapOvr>
+    <a:masterClrMapping/>
+  </p:clrMapOvr>
+</p:sld>
+</file>
+
+<file path=ppt/slides/slide12.xml><?xml version="1.0" encoding="utf-8"?>
+<p:sld xmlns:a="http://schemas.openxmlformats.org/drawingml/2006/main" xmlns:r="http://schemas.openxmlformats.org/officeDocument/2006/relationships" xmlns:p="http://schemas.openxmlformats.org/presentationml/2006/main">
+  <p:cSld>
+    <p:spTree>
+      <p:nvGrpSpPr>
+        <p:cNvPr id="1" name=""/>
+        <p:cNvGrpSpPr/>
+        <p:nvPr/>
+      </p:nvGrpSpPr>
+      <p:grpSpPr>
+        <a:xfrm>
+          <a:off x="0" y="0"/>
+          <a:ext cx="0" cy="0"/>
+          <a:chOff x="0" y="0"/>
+          <a:chExt cx="0" cy="0"/>
+        </a:xfrm>
+      </p:grpSpPr>
+      <p:sp>
+        <p:nvSpPr>
+          <p:cNvPr id="2" name="Title 1"/>
+          <p:cNvSpPr>
+            <a:spLocks noGrp="1"/>
+          </p:cNvSpPr>
+          <p:nvPr>
+            <p:ph type="title"/>
+          </p:nvPr>
+        </p:nvSpPr>
         <p:spPr/>
         <p:txBody>
           <a:bodyPr/>
@@ -4743,7 +4964,12 @@
             <p:ph idx="1"/>
           </p:nvPr>
         </p:nvSpPr>
-        <p:spPr/>
+        <p:spPr>
+          <a:xfrm>
+            <a:off x="2773599" y="1387011"/>
+            <a:ext cx="7796540" cy="4662933"/>
+          </a:xfrm>
+        </p:spPr>
         <p:txBody>
           <a:bodyPr/>
           <a:lstStyle/>
@@ -4760,25 +4986,36 @@
           </a:p>
           <a:p>
             <a:r>
-              <a:rPr lang="en-US" smtClean="0"/>
+              <a:rPr lang="en-US" dirty="0" smtClean="0"/>
               <a:t>Wally Ritchie</a:t>
             </a:r>
           </a:p>
           <a:p>
             <a:r>
-              <a:rPr lang="en-US" smtClean="0"/>
-              <a:t>Steve </a:t>
-            </a:r>
-            <a:r>
-              <a:rPr lang="en-US" dirty="0" smtClean="0"/>
-              <a:t>Conklin</a:t>
-            </a:r>
-          </a:p>
-          <a:p>
-            <a:r>
-              <a:rPr lang="en-US" dirty="0" smtClean="0"/>
-              <a:t>Michelle Thompson</a:t>
-            </a:r>
+              <a:rPr lang="en-US" dirty="0" smtClean="0"/>
+              <a:t>Steve Conklin</a:t>
+            </a:r>
+          </a:p>
+          <a:p>
+            <a:r>
+              <a:rPr lang="en-US" dirty="0" smtClean="0"/>
+              <a:t>Michelle </a:t>
+            </a:r>
+            <a:r>
+              <a:rPr lang="en-US" dirty="0" smtClean="0"/>
+              <a:t>Thompson</a:t>
+            </a:r>
+          </a:p>
+          <a:p>
+            <a:r>
+              <a:rPr lang="en-US" dirty="0" smtClean="0"/>
+              <a:t>Phil </a:t>
+            </a:r>
+            <a:r>
+              <a:rPr lang="en-US" dirty="0" err="1" smtClean="0"/>
+              <a:t>Karn</a:t>
+            </a:r>
+            <a:endParaRPr lang="en-US" dirty="0" smtClean="0"/>
           </a:p>
         </p:txBody>
       </p:sp>
@@ -4786,6 +5023,92 @@
     <p:extLst>
       <p:ext uri="{BB962C8B-B14F-4D97-AF65-F5344CB8AC3E}">
         <p14:creationId xmlns:p14="http://schemas.microsoft.com/office/powerpoint/2010/main" val="1205812909"/>
+      </p:ext>
+    </p:extLst>
+  </p:cSld>
+  <p:clrMapOvr>
+    <a:masterClrMapping/>
+  </p:clrMapOvr>
+</p:sld>
+</file>
+
+<file path=ppt/slides/slide13.xml><?xml version="1.0" encoding="utf-8"?>
+<p:sld xmlns:a="http://schemas.openxmlformats.org/drawingml/2006/main" xmlns:r="http://schemas.openxmlformats.org/officeDocument/2006/relationships" xmlns:p="http://schemas.openxmlformats.org/presentationml/2006/main">
+  <p:cSld>
+    <p:spTree>
+      <p:nvGrpSpPr>
+        <p:cNvPr id="1" name=""/>
+        <p:cNvGrpSpPr/>
+        <p:nvPr/>
+      </p:nvGrpSpPr>
+      <p:grpSpPr>
+        <a:xfrm>
+          <a:off x="0" y="0"/>
+          <a:ext cx="0" cy="0"/>
+          <a:chOff x="0" y="0"/>
+          <a:chExt cx="0" cy="0"/>
+        </a:xfrm>
+      </p:grpSpPr>
+      <p:sp>
+        <p:nvSpPr>
+          <p:cNvPr id="2" name="Title 1"/>
+          <p:cNvSpPr>
+            <a:spLocks noGrp="1"/>
+          </p:cNvSpPr>
+          <p:nvPr>
+            <p:ph type="title"/>
+          </p:nvPr>
+        </p:nvSpPr>
+        <p:spPr/>
+        <p:txBody>
+          <a:bodyPr/>
+          <a:lstStyle/>
+          <a:p>
+            <a:r>
+              <a:rPr lang="en-US" dirty="0" smtClean="0"/>
+              <a:t>Motion</a:t>
+            </a:r>
+            <a:endParaRPr lang="en-US" dirty="0"/>
+          </a:p>
+        </p:txBody>
+      </p:sp>
+      <p:sp>
+        <p:nvSpPr>
+          <p:cNvPr id="3" name="Content Placeholder 2"/>
+          <p:cNvSpPr>
+            <a:spLocks noGrp="1"/>
+          </p:cNvSpPr>
+          <p:nvPr>
+            <p:ph idx="1"/>
+          </p:nvPr>
+        </p:nvSpPr>
+        <p:spPr>
+          <a:xfrm>
+            <a:off x="1397285" y="1500027"/>
+            <a:ext cx="9172854" cy="4549917"/>
+          </a:xfrm>
+        </p:spPr>
+        <p:txBody>
+          <a:bodyPr/>
+          <a:lstStyle/>
+          <a:p>
+            <a:r>
+              <a:rPr lang="en-US" dirty="0" smtClean="0"/>
+              <a:t>AMSAT shall subscribe to GitHub Enterprise in order to provide a modern consolidated document server for all ITAR-controlled payload development. </a:t>
+            </a:r>
+          </a:p>
+          <a:p>
+            <a:r>
+              <a:rPr lang="en-US" dirty="0" smtClean="0"/>
+              <a:t>This system is open to all US persons that want to volunteer for payload design for AMSAT. </a:t>
+            </a:r>
+          </a:p>
+        </p:txBody>
+      </p:sp>
+    </p:spTree>
+    <p:extLst>
+      <p:ext uri="{BB962C8B-B14F-4D97-AF65-F5344CB8AC3E}">
+        <p14:creationId xmlns:p14="http://schemas.microsoft.com/office/powerpoint/2010/main" val="1339238468"/>
       </p:ext>
     </p:extLst>
   </p:cSld>
@@ -4871,13 +5194,21 @@
           <a:p>
             <a:r>
               <a:rPr lang="en-US" dirty="0" smtClean="0"/>
-              <a:t>AMSAT does not currently have a data management system that fully complies with ITAR or EAR.</a:t>
-            </a:r>
-          </a:p>
-          <a:p>
-            <a:r>
-              <a:rPr lang="en-US" dirty="0" smtClean="0"/>
-              <a:t>Additional regulations go into effect at the end of December 2017</a:t>
+              <a:t>AMSAT does not currently have a data management system that fully complies with ITAR or EAR</a:t>
+            </a:r>
+            <a:r>
+              <a:rPr lang="en-US" dirty="0" smtClean="0"/>
+              <a:t>. </a:t>
+            </a:r>
+          </a:p>
+          <a:p>
+            <a:r>
+              <a:rPr lang="en-US" dirty="0" smtClean="0"/>
+              <a:t>Additional </a:t>
+            </a:r>
+            <a:r>
+              <a:rPr lang="en-US" dirty="0" smtClean="0"/>
+              <a:t>regulations go into effect at the end of December 2017</a:t>
             </a:r>
             <a:br>
               <a:rPr lang="en-US" dirty="0" smtClean="0"/>
@@ -5025,20 +5356,17 @@
           <a:p>
             <a:r>
               <a:rPr lang="en-US" dirty="0" smtClean="0"/>
-              <a:t>Digital payload development does not have a legal AMSAT workspace. </a:t>
-            </a:r>
-          </a:p>
-          <a:p>
-            <a:r>
-              <a:rPr lang="en-US" dirty="0" smtClean="0"/>
-              <a:t>There is a significant imbalance between the digital/legacy payload ratio outside AMSAT-NA compared to within AMSAT-NA. </a:t>
-            </a:r>
-          </a:p>
-          <a:p>
-            <a:r>
-              <a:rPr lang="en-US" dirty="0" smtClean="0"/>
-              <a:t>There are a sufficient number of volunteers willing to do digital payload design for AMSAT in order to advance the radio art and compete for launches. </a:t>
-            </a:r>
+              <a:t>Payload </a:t>
+            </a:r>
+            <a:r>
+              <a:rPr lang="en-US" dirty="0" smtClean="0"/>
+              <a:t>development </a:t>
+            </a:r>
+            <a:r>
+              <a:rPr lang="en-US" dirty="0" smtClean="0"/>
+              <a:t>needs an easy to use and easy to maintain central workspace where all US persons can work together to support AMSAT’s mission. </a:t>
+            </a:r>
+            <a:endParaRPr lang="en-US" dirty="0" smtClean="0"/>
           </a:p>
         </p:txBody>
       </p:sp>
@@ -5133,7 +5461,19 @@
           <a:p>
             <a:r>
               <a:rPr lang="en-US" dirty="0" smtClean="0"/>
-              <a:t>This proposal is for AMSAT to pay for GitHub Enterprise service.</a:t>
+              <a:t>One compelling solution is </a:t>
+            </a:r>
+            <a:r>
+              <a:rPr lang="en-US" dirty="0" smtClean="0"/>
+              <a:t>for AMSAT to </a:t>
+            </a:r>
+            <a:r>
+              <a:rPr lang="en-US" dirty="0" smtClean="0"/>
+              <a:t>buy GitHub </a:t>
+            </a:r>
+            <a:r>
+              <a:rPr lang="en-US" dirty="0" smtClean="0"/>
+              <a:t>Enterprise service.</a:t>
             </a:r>
           </a:p>
           <a:p>
@@ -5151,7 +5491,15 @@
           <a:p>
             <a:r>
               <a:rPr lang="en-US" dirty="0" smtClean="0"/>
-              <a:t>They have provided a 25% discount to AMSAT because we are a 501c3.</a:t>
+              <a:t>They have </a:t>
+            </a:r>
+            <a:r>
+              <a:rPr lang="en-US" dirty="0" smtClean="0"/>
+              <a:t>offered a </a:t>
+            </a:r>
+            <a:r>
+              <a:rPr lang="en-US" dirty="0" smtClean="0"/>
+              <a:t>25% discount to AMSAT because we are a 501c3.</a:t>
             </a:r>
           </a:p>
         </p:txBody>
@@ -5188,6 +5536,120 @@
       </p:grpSpPr>
       <p:sp>
         <p:nvSpPr>
+          <p:cNvPr id="2" name="Title 1"/>
+          <p:cNvSpPr>
+            <a:spLocks noGrp="1"/>
+          </p:cNvSpPr>
+          <p:nvPr>
+            <p:ph type="title"/>
+          </p:nvPr>
+        </p:nvSpPr>
+        <p:spPr/>
+        <p:txBody>
+          <a:bodyPr/>
+          <a:lstStyle/>
+          <a:p>
+            <a:r>
+              <a:rPr lang="en-US" dirty="0" smtClean="0"/>
+              <a:t>Solution for 10 User Limit</a:t>
+            </a:r>
+            <a:endParaRPr lang="en-US" dirty="0"/>
+          </a:p>
+        </p:txBody>
+      </p:sp>
+      <p:sp>
+        <p:nvSpPr>
+          <p:cNvPr id="3" name="Content Placeholder 2"/>
+          <p:cNvSpPr>
+            <a:spLocks noGrp="1"/>
+          </p:cNvSpPr>
+          <p:nvPr>
+            <p:ph idx="1"/>
+          </p:nvPr>
+        </p:nvSpPr>
+        <p:spPr>
+          <a:xfrm>
+            <a:off x="1273996" y="1469204"/>
+            <a:ext cx="9296143" cy="4580740"/>
+          </a:xfrm>
+        </p:spPr>
+        <p:txBody>
+          <a:bodyPr>
+            <a:normAutofit/>
+          </a:bodyPr>
+          <a:lstStyle/>
+          <a:p>
+            <a:r>
+              <a:rPr lang="en-US" dirty="0" smtClean="0"/>
+              <a:t>In order to avoid exclusionary practices, where the 10 users are assigned and and all subsequent volunteers are shut out indefinitely, the </a:t>
+            </a:r>
+            <a:r>
+              <a:rPr lang="en-US" dirty="0"/>
+              <a:t>10 user </a:t>
+            </a:r>
+            <a:r>
+              <a:rPr lang="en-US" dirty="0" smtClean="0"/>
+              <a:t>accounts should be set up as amsat1, amsat2, amsat3, amsat4, amsat5, etc. </a:t>
+            </a:r>
+          </a:p>
+          <a:p>
+            <a:r>
+              <a:rPr lang="en-US" dirty="0" smtClean="0"/>
+              <a:t>Each user account has a password assigned by the administrator. </a:t>
+            </a:r>
+          </a:p>
+          <a:p>
+            <a:r>
+              <a:rPr lang="en-US" dirty="0" smtClean="0"/>
+              <a:t>Under this scheme, several people share one user account for uploading and downloading documents. </a:t>
+            </a:r>
+          </a:p>
+          <a:p>
+            <a:r>
+              <a:rPr lang="en-US" dirty="0" smtClean="0"/>
+              <a:t>The administrator keeps a roster of who was assigned to each user account. </a:t>
+            </a:r>
+          </a:p>
+          <a:p>
+            <a:r>
+              <a:rPr lang="en-US" dirty="0" smtClean="0"/>
+              <a:t>Several people have volunteered to administer if the current IT admin declines. </a:t>
+            </a:r>
+          </a:p>
+        </p:txBody>
+      </p:sp>
+    </p:spTree>
+    <p:extLst>
+      <p:ext uri="{BB962C8B-B14F-4D97-AF65-F5344CB8AC3E}">
+        <p14:creationId xmlns:p14="http://schemas.microsoft.com/office/powerpoint/2010/main" val="1334912613"/>
+      </p:ext>
+    </p:extLst>
+  </p:cSld>
+  <p:clrMapOvr>
+    <a:masterClrMapping/>
+  </p:clrMapOvr>
+</p:sld>
+</file>
+
+<file path=ppt/slides/slide6.xml><?xml version="1.0" encoding="utf-8"?>
+<p:sld xmlns:a="http://schemas.openxmlformats.org/drawingml/2006/main" xmlns:r="http://schemas.openxmlformats.org/officeDocument/2006/relationships" xmlns:p="http://schemas.openxmlformats.org/presentationml/2006/main">
+  <p:cSld>
+    <p:spTree>
+      <p:nvGrpSpPr>
+        <p:cNvPr id="1" name=""/>
+        <p:cNvGrpSpPr/>
+        <p:nvPr/>
+      </p:nvGrpSpPr>
+      <p:grpSpPr>
+        <a:xfrm>
+          <a:off x="0" y="0"/>
+          <a:ext cx="0" cy="0"/>
+          <a:chOff x="0" y="0"/>
+          <a:chExt cx="0" cy="0"/>
+        </a:xfrm>
+      </p:grpSpPr>
+      <p:sp>
+        <p:nvSpPr>
           <p:cNvPr id="5" name="Rectangle 4"/>
           <p:cNvSpPr/>
           <p:nvPr/>
@@ -5272,7 +5734,7 @@
 </p:sld>
 </file>
 
-<file path=ppt/slides/slide6.xml><?xml version="1.0" encoding="utf-8"?>
+<file path=ppt/slides/slide7.xml><?xml version="1.0" encoding="utf-8"?>
 <p:sld xmlns:a="http://schemas.openxmlformats.org/drawingml/2006/main" xmlns:r="http://schemas.openxmlformats.org/officeDocument/2006/relationships" xmlns:p="http://schemas.openxmlformats.org/presentationml/2006/main">
   <p:cSld>
     <p:spTree>
@@ -5332,138 +5794,6 @@
 </p:sld>
 </file>
 
-<file path=ppt/slides/slide7.xml><?xml version="1.0" encoding="utf-8"?>
-<p:sld xmlns:a="http://schemas.openxmlformats.org/drawingml/2006/main" xmlns:r="http://schemas.openxmlformats.org/officeDocument/2006/relationships" xmlns:p="http://schemas.openxmlformats.org/presentationml/2006/main">
-  <p:cSld>
-    <p:spTree>
-      <p:nvGrpSpPr>
-        <p:cNvPr id="1" name=""/>
-        <p:cNvGrpSpPr/>
-        <p:nvPr/>
-      </p:nvGrpSpPr>
-      <p:grpSpPr>
-        <a:xfrm>
-          <a:off x="0" y="0"/>
-          <a:ext cx="0" cy="0"/>
-          <a:chOff x="0" y="0"/>
-          <a:chExt cx="0" cy="0"/>
-        </a:xfrm>
-      </p:grpSpPr>
-      <p:sp>
-        <p:nvSpPr>
-          <p:cNvPr id="2" name="Title 1"/>
-          <p:cNvSpPr>
-            <a:spLocks noGrp="1"/>
-          </p:cNvSpPr>
-          <p:nvPr>
-            <p:ph type="title"/>
-          </p:nvPr>
-        </p:nvSpPr>
-        <p:spPr/>
-        <p:txBody>
-          <a:bodyPr/>
-          <a:lstStyle/>
-          <a:p>
-            <a:r>
-              <a:rPr lang="en-US" dirty="0" smtClean="0"/>
-              <a:t>Pricing</a:t>
-            </a:r>
-            <a:endParaRPr lang="en-US" dirty="0"/>
-          </a:p>
-        </p:txBody>
-      </p:sp>
-      <p:sp>
-        <p:nvSpPr>
-          <p:cNvPr id="3" name="Content Placeholder 2"/>
-          <p:cNvSpPr>
-            <a:spLocks noGrp="1"/>
-          </p:cNvSpPr>
-          <p:nvPr>
-            <p:ph idx="1"/>
-          </p:nvPr>
-        </p:nvSpPr>
-        <p:spPr/>
-        <p:txBody>
-          <a:bodyPr>
-            <a:normAutofit fontScale="92500" lnSpcReduction="10000"/>
-          </a:bodyPr>
-          <a:lstStyle/>
-          <a:p>
-            <a:r>
-              <a:rPr lang="en-US" dirty="0" smtClean="0"/>
-              <a:t>GitHub Enterprise offers service in 10-user blocks.</a:t>
-            </a:r>
-          </a:p>
-          <a:p>
-            <a:r>
-              <a:rPr lang="en-US" dirty="0" smtClean="0"/>
-              <a:t>One discounted license is</a:t>
-            </a:r>
-            <a:r>
-              <a:rPr lang="en-US" dirty="0"/>
-              <a:t> $1,890, down from $</a:t>
-            </a:r>
-            <a:r>
-              <a:rPr lang="en-US" dirty="0" smtClean="0"/>
-              <a:t>2,520, paid annually. One license is 10 user license seats.</a:t>
-            </a:r>
-          </a:p>
-          <a:p>
-            <a:r>
-              <a:rPr lang="en-US" dirty="0"/>
-              <a:t>Helpful FAQ: </a:t>
-            </a:r>
-            <a:r>
-              <a:rPr lang="en-US" dirty="0">
-                <a:hlinkClick r:id="rId2"/>
-              </a:rPr>
-              <a:t>https://</a:t>
-            </a:r>
-            <a:r>
-              <a:rPr lang="en-US" dirty="0" smtClean="0">
-                <a:hlinkClick r:id="rId2"/>
-              </a:rPr>
-              <a:t>enterprise.github.com/faq</a:t>
-            </a:r>
-            <a:endParaRPr lang="en-US" dirty="0" smtClean="0"/>
-          </a:p>
-          <a:p>
-            <a:r>
-              <a:rPr lang="en-US" dirty="0"/>
-              <a:t>A user account is considered to be dormant if it has not been active for at least a month. You may choose to suspend dormant users to free up license seats</a:t>
-            </a:r>
-            <a:r>
-              <a:rPr lang="en-US" dirty="0" smtClean="0"/>
-              <a:t>. </a:t>
-            </a:r>
-          </a:p>
-          <a:p>
-            <a:r>
-              <a:rPr lang="en-US" dirty="0" smtClean="0"/>
-              <a:t>The 10 users can rotate among whoever is actively developing. </a:t>
-            </a:r>
-          </a:p>
-          <a:p>
-            <a:r>
-              <a:rPr lang="en-US" dirty="0" smtClean="0"/>
-              <a:t>Full utilization would be $15.75 per user per month.</a:t>
-            </a:r>
-          </a:p>
-        </p:txBody>
-      </p:sp>
-    </p:spTree>
-    <p:extLst>
-      <p:ext uri="{BB962C8B-B14F-4D97-AF65-F5344CB8AC3E}">
-        <p14:creationId xmlns:p14="http://schemas.microsoft.com/office/powerpoint/2010/main" val="1396842103"/>
-      </p:ext>
-    </p:extLst>
-  </p:cSld>
-  <p:clrMapOvr>
-    <a:masterClrMapping/>
-  </p:clrMapOvr>
-</p:sld>
-</file>
-
 <file path=ppt/slides/slide8.xml><?xml version="1.0" encoding="utf-8"?>
 <p:sld xmlns:a="http://schemas.openxmlformats.org/drawingml/2006/main" xmlns:r="http://schemas.openxmlformats.org/officeDocument/2006/relationships" xmlns:p="http://schemas.openxmlformats.org/presentationml/2006/main">
   <p:cSld>
@@ -5498,7 +5828,7 @@
           <a:p>
             <a:r>
               <a:rPr lang="en-US" dirty="0" smtClean="0"/>
-              <a:t>Other 501c3 Organizations Using GitHub Enterprise</a:t>
+              <a:t>Pricing</a:t>
             </a:r>
             <a:endParaRPr lang="en-US" dirty="0"/>
           </a:p>
@@ -5514,91 +5844,99 @@
             <p:ph idx="1"/>
           </p:nvPr>
         </p:nvSpPr>
-        <p:spPr/>
+        <p:spPr>
+          <a:xfrm>
+            <a:off x="1356189" y="2052116"/>
+            <a:ext cx="9213950" cy="3997828"/>
+          </a:xfrm>
+        </p:spPr>
         <p:txBody>
           <a:bodyPr>
-            <a:normAutofit fontScale="85000" lnSpcReduction="20000"/>
+            <a:normAutofit lnSpcReduction="10000"/>
           </a:bodyPr>
           <a:lstStyle/>
           <a:p>
             <a:r>
-              <a:rPr lang="en-US" dirty="0"/>
-              <a:t>- DLR Robotic &amp; Mechatronics Center</a:t>
-            </a:r>
-          </a:p>
-          <a:p>
-            <a:r>
-              <a:rPr lang="en-US" dirty="0"/>
-              <a:t>- Battelle Ecology</a:t>
-            </a:r>
-            <a:br>
-              <a:rPr lang="en-US" dirty="0"/>
-            </a:br>
-            <a:r>
-              <a:rPr lang="en-US" dirty="0"/>
-              <a:t>- LENA Research Foundation</a:t>
-            </a:r>
-          </a:p>
-          <a:p>
-            <a:r>
-              <a:rPr lang="en-US" dirty="0"/>
-              <a:t>- Project Management Institute</a:t>
-            </a:r>
-          </a:p>
-          <a:p>
-            <a:r>
-              <a:rPr lang="en-US" dirty="0"/>
-              <a:t>- </a:t>
-            </a:r>
-            <a:r>
-              <a:rPr lang="en-US" dirty="0" err="1"/>
-              <a:t>Eduserv</a:t>
-            </a:r>
-            <a:endParaRPr lang="en-US" dirty="0"/>
-          </a:p>
-          <a:p>
-            <a:r>
-              <a:rPr lang="en-US" dirty="0"/>
-              <a:t>- IMF</a:t>
-            </a:r>
-          </a:p>
-          <a:p>
-            <a:r>
-              <a:rPr lang="en-US" dirty="0"/>
-              <a:t>- Max Planck </a:t>
-            </a:r>
-            <a:r>
-              <a:rPr lang="en-US" dirty="0" err="1"/>
-              <a:t>Institue</a:t>
-            </a:r>
-            <a:r>
-              <a:rPr lang="en-US" dirty="0"/>
-              <a:t> for Molecular Genetics</a:t>
-            </a:r>
-          </a:p>
-          <a:p>
-            <a:r>
-              <a:rPr lang="en-US" dirty="0"/>
-              <a:t>- Max Planck Institute for Metabolism Research</a:t>
-            </a:r>
-          </a:p>
-          <a:p>
-            <a:r>
-              <a:rPr lang="en-US" dirty="0"/>
-              <a:t>- The Linux </a:t>
-            </a:r>
-            <a:r>
-              <a:rPr lang="en-US" dirty="0" smtClean="0"/>
-              <a:t>Foundation</a:t>
-            </a:r>
-            <a:endParaRPr lang="en-US" dirty="0"/>
+              <a:rPr lang="en-US" dirty="0" smtClean="0"/>
+              <a:t>GitHub Enterprise offers service in 10-user blocks.</a:t>
+            </a:r>
+          </a:p>
+          <a:p>
+            <a:r>
+              <a:rPr lang="en-US" dirty="0" smtClean="0"/>
+              <a:t>One discounted license is</a:t>
+            </a:r>
+            <a:r>
+              <a:rPr lang="en-US" dirty="0"/>
+              <a:t> $1,890, down from $</a:t>
+            </a:r>
+            <a:r>
+              <a:rPr lang="en-US" dirty="0" smtClean="0"/>
+              <a:t>2,520, paid annually. One license is 10 </a:t>
+            </a:r>
+            <a:r>
+              <a:rPr lang="en-US" dirty="0" smtClean="0"/>
+              <a:t>user account seats</a:t>
+            </a:r>
+            <a:r>
+              <a:rPr lang="en-US" dirty="0" smtClean="0"/>
+              <a:t>.</a:t>
+            </a:r>
+          </a:p>
+          <a:p>
+            <a:r>
+              <a:rPr lang="en-US" dirty="0"/>
+              <a:t>Helpful FAQ: </a:t>
+            </a:r>
+            <a:r>
+              <a:rPr lang="en-US" dirty="0">
+                <a:hlinkClick r:id="rId2"/>
+              </a:rPr>
+              <a:t>https://</a:t>
+            </a:r>
+            <a:r>
+              <a:rPr lang="en-US" dirty="0" smtClean="0">
+                <a:hlinkClick r:id="rId2"/>
+              </a:rPr>
+              <a:t>enterprise.github.com/faq</a:t>
+            </a:r>
+            <a:endParaRPr lang="en-US" dirty="0" smtClean="0"/>
+          </a:p>
+          <a:p>
+            <a:r>
+              <a:rPr lang="en-US" dirty="0"/>
+              <a:t>A user account is considered to be dormant if it has not been active for at least a month. You may choose to suspend dormant users to free up license </a:t>
+            </a:r>
+            <a:r>
+              <a:rPr lang="en-US" dirty="0" smtClean="0"/>
+              <a:t>seats, but this should not be necessary if the user licenses are abstracted as previously discussed.</a:t>
+            </a:r>
+            <a:endParaRPr lang="en-US" dirty="0" smtClean="0"/>
+          </a:p>
+          <a:p>
+            <a:r>
+              <a:rPr lang="en-US" dirty="0" smtClean="0"/>
+              <a:t>Full </a:t>
+            </a:r>
+            <a:r>
+              <a:rPr lang="en-US" dirty="0" smtClean="0"/>
+              <a:t>utilization would be $15.75 per user </a:t>
+            </a:r>
+            <a:r>
+              <a:rPr lang="en-US" dirty="0" smtClean="0"/>
+              <a:t>account per </a:t>
+            </a:r>
+            <a:r>
+              <a:rPr lang="en-US" dirty="0" smtClean="0"/>
+              <a:t>month.</a:t>
+            </a:r>
           </a:p>
         </p:txBody>
       </p:sp>
     </p:spTree>
     <p:extLst>
       <p:ext uri="{BB962C8B-B14F-4D97-AF65-F5344CB8AC3E}">
-        <p14:creationId xmlns:p14="http://schemas.microsoft.com/office/powerpoint/2010/main" val="395745670"/>
+        <p14:creationId xmlns:p14="http://schemas.microsoft.com/office/powerpoint/2010/main" val="1396842103"/>
       </p:ext>
     </p:extLst>
   </p:cSld>
@@ -5642,7 +5980,7 @@
           <a:p>
             <a:r>
               <a:rPr lang="en-US" dirty="0" smtClean="0"/>
-              <a:t>Provisioning and Installation</a:t>
+              <a:t>Other 501c3 Organizations Using GitHub Enterprise</a:t>
             </a:r>
             <a:endParaRPr lang="en-US" dirty="0"/>
           </a:p>
@@ -5658,12 +5996,7 @@
             <p:ph idx="1"/>
           </p:nvPr>
         </p:nvSpPr>
-        <p:spPr>
-          <a:xfrm>
-            <a:off x="1479479" y="1428108"/>
-            <a:ext cx="9090660" cy="4621836"/>
-          </a:xfrm>
-        </p:spPr>
+        <p:spPr/>
         <p:txBody>
           <a:bodyPr>
             <a:normAutofit fontScale="85000" lnSpcReduction="20000"/>
@@ -5671,73 +6004,83 @@
           <a:lstStyle/>
           <a:p>
             <a:r>
-              <a:rPr lang="en-US" dirty="0" smtClean="0"/>
-              <a:t>There are a wide variety of ways to provision and install GitHub Enterprise. Since it’s a virtual machine, we have many options. </a:t>
-            </a:r>
-          </a:p>
-          <a:p>
-            <a:r>
-              <a:rPr lang="en-US" dirty="0" smtClean="0"/>
-              <a:t>Amazon Web Service</a:t>
-            </a:r>
-          </a:p>
-          <a:p>
-            <a:r>
-              <a:rPr lang="en-US" dirty="0" smtClean="0"/>
-              <a:t>Azure</a:t>
-            </a:r>
-          </a:p>
-          <a:p>
-            <a:r>
-              <a:rPr lang="en-US" dirty="0" smtClean="0"/>
-              <a:t>Google Cloud</a:t>
-            </a:r>
-          </a:p>
-          <a:p>
-            <a:r>
-              <a:rPr lang="en-US" dirty="0" smtClean="0"/>
-              <a:t>Hyper-V </a:t>
-            </a:r>
-          </a:p>
-          <a:p>
-            <a:r>
-              <a:rPr lang="en-US" dirty="0" smtClean="0"/>
-              <a:t>OpenStack KVM</a:t>
-            </a:r>
-          </a:p>
-          <a:p>
-            <a:r>
-              <a:rPr lang="en-US" dirty="0" smtClean="0"/>
-              <a:t>VMWare</a:t>
-            </a:r>
-          </a:p>
-          <a:p>
-            <a:r>
-              <a:rPr lang="en-US" dirty="0" err="1" smtClean="0"/>
-              <a:t>XenServer</a:t>
-            </a:r>
-            <a:endParaRPr lang="en-US" dirty="0" smtClean="0"/>
-          </a:p>
-          <a:p>
-            <a:r>
-              <a:rPr lang="en-US" dirty="0"/>
-              <a:t>https://</a:t>
+              <a:rPr lang="en-US" dirty="0"/>
+              <a:t>- DLR Robotic &amp; Mechatronics Center</a:t>
+            </a:r>
+          </a:p>
+          <a:p>
+            <a:r>
+              <a:rPr lang="en-US" dirty="0"/>
+              <a:t>- Battelle Ecology</a:t>
+            </a:r>
+            <a:br>
+              <a:rPr lang="en-US" dirty="0"/>
+            </a:br>
+            <a:r>
+              <a:rPr lang="en-US" dirty="0"/>
+              <a:t>- LENA Research Foundation</a:t>
+            </a:r>
+          </a:p>
+          <a:p>
+            <a:r>
+              <a:rPr lang="en-US" dirty="0"/>
+              <a:t>- Project Management Institute</a:t>
+            </a:r>
+          </a:p>
+          <a:p>
+            <a:r>
+              <a:rPr lang="en-US" dirty="0"/>
+              <a:t>- </a:t>
             </a:r>
             <a:r>
               <a:rPr lang="en-US" dirty="0" err="1"/>
-              <a:t>help.github.com</a:t>
-            </a:r>
-            <a:r>
-              <a:rPr lang="en-US" dirty="0"/>
-              <a:t>/enterprise/2.11/admin/guides/installation/provisioning-and-installation/</a:t>
-            </a:r>
+              <a:t>Eduserv</a:t>
+            </a:r>
+            <a:endParaRPr lang="en-US" dirty="0"/>
+          </a:p>
+          <a:p>
+            <a:r>
+              <a:rPr lang="en-US" dirty="0"/>
+              <a:t>- IMF</a:t>
+            </a:r>
+          </a:p>
+          <a:p>
+            <a:r>
+              <a:rPr lang="en-US" dirty="0"/>
+              <a:t>- Max Planck </a:t>
+            </a:r>
+            <a:r>
+              <a:rPr lang="en-US" dirty="0" err="1"/>
+              <a:t>Institue</a:t>
+            </a:r>
+            <a:r>
+              <a:rPr lang="en-US" dirty="0"/>
+              <a:t> for Molecular Genetics</a:t>
+            </a:r>
+          </a:p>
+          <a:p>
+            <a:r>
+              <a:rPr lang="en-US" dirty="0"/>
+              <a:t>- Max Planck Institute for Metabolism Research</a:t>
+            </a:r>
+          </a:p>
+          <a:p>
+            <a:r>
+              <a:rPr lang="en-US" dirty="0"/>
+              <a:t>- The Linux </a:t>
+            </a:r>
+            <a:r>
+              <a:rPr lang="en-US" dirty="0" smtClean="0"/>
+              <a:t>Foundation</a:t>
+            </a:r>
+            <a:endParaRPr lang="en-US" dirty="0"/>
           </a:p>
         </p:txBody>
       </p:sp>
     </p:spTree>
     <p:extLst>
       <p:ext uri="{BB962C8B-B14F-4D97-AF65-F5344CB8AC3E}">
-        <p14:creationId xmlns:p14="http://schemas.microsoft.com/office/powerpoint/2010/main" val="727356344"/>
+        <p14:creationId xmlns:p14="http://schemas.microsoft.com/office/powerpoint/2010/main" val="395745670"/>
       </p:ext>
     </p:extLst>
   </p:cSld>

</xml_diff>